<commit_message>
Colours added to cards. It broke 13 tests!
</commit_message>
<xml_diff>
--- a/codeclan_project2_blackjack_presentation_2.pptx
+++ b/codeclan_project2_blackjack_presentation_2.pptx
@@ -5,16 +5,19 @@
     <p:sldMasterId id="2147483840" r:id="rId1"/>
   </p:sldMasterIdLst>
   <p:notesMasterIdLst>
-    <p:notesMasterId r:id="rId9"/>
+    <p:notesMasterId r:id="rId12"/>
   </p:notesMasterIdLst>
   <p:sldIdLst>
     <p:sldId id="256" r:id="rId2"/>
-    <p:sldId id="257" r:id="rId3"/>
-    <p:sldId id="258" r:id="rId4"/>
-    <p:sldId id="259" r:id="rId5"/>
-    <p:sldId id="260" r:id="rId6"/>
-    <p:sldId id="261" r:id="rId7"/>
-    <p:sldId id="262" r:id="rId8"/>
+    <p:sldId id="263" r:id="rId3"/>
+    <p:sldId id="257" r:id="rId4"/>
+    <p:sldId id="265" r:id="rId5"/>
+    <p:sldId id="258" r:id="rId6"/>
+    <p:sldId id="259" r:id="rId7"/>
+    <p:sldId id="260" r:id="rId8"/>
+    <p:sldId id="261" r:id="rId9"/>
+    <p:sldId id="264" r:id="rId10"/>
+    <p:sldId id="262" r:id="rId11"/>
   </p:sldIdLst>
   <p:sldSz cx="12192000" cy="6858000"/>
   <p:notesSz cx="6858000" cy="9144000"/>
@@ -214,7 +217,7 @@
           <a:p>
             <a:fld id="{4E064CCA-15A1-9345-B689-FC4B1B50FB11}" type="datetimeFigureOut">
               <a:rPr lang="en-US" smtClean="0"/>
-              <a:t>9/27/17</a:t>
+              <a:t>9/28/17</a:t>
             </a:fld>
             <a:endParaRPr lang="en-US"/>
           </a:p>
@@ -557,6 +560,90 @@
     <p:extLst>
       <p:ext uri="{BB962C8B-B14F-4D97-AF65-F5344CB8AC3E}">
         <p14:creationId xmlns:p14="http://schemas.microsoft.com/office/powerpoint/2010/main" val="1962616358"/>
+      </p:ext>
+    </p:extLst>
+  </p:cSld>
+  <p:clrMapOvr>
+    <a:masterClrMapping/>
+  </p:clrMapOvr>
+</p:notes>
+</file>
+
+<file path=ppt/notesSlides/notesSlide2.xml><?xml version="1.0" encoding="utf-8"?>
+<p:notes xmlns:a="http://schemas.openxmlformats.org/drawingml/2006/main" xmlns:r="http://schemas.openxmlformats.org/officeDocument/2006/relationships" xmlns:p="http://schemas.openxmlformats.org/presentationml/2006/main">
+  <p:cSld>
+    <p:spTree>
+      <p:nvGrpSpPr>
+        <p:cNvPr id="1" name=""/>
+        <p:cNvGrpSpPr/>
+        <p:nvPr/>
+      </p:nvGrpSpPr>
+      <p:grpSpPr>
+        <a:xfrm>
+          <a:off x="0" y="0"/>
+          <a:ext cx="0" cy="0"/>
+          <a:chOff x="0" y="0"/>
+          <a:chExt cx="0" cy="0"/>
+        </a:xfrm>
+      </p:grpSpPr>
+      <p:sp>
+        <p:nvSpPr>
+          <p:cNvPr id="2" name="Slide Image Placeholder 1"/>
+          <p:cNvSpPr>
+            <a:spLocks noGrp="1" noRot="1" noChangeAspect="1"/>
+          </p:cNvSpPr>
+          <p:nvPr>
+            <p:ph type="sldImg"/>
+          </p:nvPr>
+        </p:nvSpPr>
+        <p:spPr/>
+      </p:sp>
+      <p:sp>
+        <p:nvSpPr>
+          <p:cNvPr id="3" name="Notes Placeholder 2"/>
+          <p:cNvSpPr>
+            <a:spLocks noGrp="1"/>
+          </p:cNvSpPr>
+          <p:nvPr>
+            <p:ph type="body" idx="1"/>
+          </p:nvPr>
+        </p:nvSpPr>
+        <p:spPr/>
+        <p:txBody>
+          <a:bodyPr/>
+          <a:lstStyle/>
+          <a:p>
+            <a:endParaRPr lang="en-US" dirty="0"/>
+          </a:p>
+        </p:txBody>
+      </p:sp>
+      <p:sp>
+        <p:nvSpPr>
+          <p:cNvPr id="4" name="Slide Number Placeholder 3"/>
+          <p:cNvSpPr>
+            <a:spLocks noGrp="1"/>
+          </p:cNvSpPr>
+          <p:nvPr>
+            <p:ph type="sldNum" sz="quarter" idx="10"/>
+          </p:nvPr>
+        </p:nvSpPr>
+        <p:spPr/>
+        <p:txBody>
+          <a:bodyPr/>
+          <a:lstStyle/>
+          <a:p>
+            <a:fld id="{5E45BBB7-3EF3-EE4C-881B-FD079AA041E8}" type="slidenum">
+              <a:rPr lang="en-US" smtClean="0"/>
+              <a:t>2</a:t>
+            </a:fld>
+            <a:endParaRPr lang="en-US"/>
+          </a:p>
+        </p:txBody>
+      </p:sp>
+    </p:spTree>
+    <p:extLst>
+      <p:ext uri="{BB962C8B-B14F-4D97-AF65-F5344CB8AC3E}">
+        <p14:creationId xmlns:p14="http://schemas.microsoft.com/office/powerpoint/2010/main" val="822693522"/>
       </p:ext>
     </p:extLst>
   </p:cSld>
@@ -1067,7 +1154,7 @@
           <a:p>
             <a:fld id="{83284890-85D2-4D7B-8EF5-15A9C1DB8F42}" type="datetimeFigureOut">
               <a:rPr lang="en-US" smtClean="0"/>
-              <a:t>9/27/17</a:t>
+              <a:t>9/28/17</a:t>
             </a:fld>
             <a:endParaRPr lang="en-US"/>
           </a:p>
@@ -1247,7 +1334,7 @@
           <a:p>
             <a:fld id="{87157CC2-0FC8-4686-B024-99790E0F5162}" type="datetimeFigureOut">
               <a:rPr lang="en-US" smtClean="0"/>
-              <a:t>9/27/17</a:t>
+              <a:t>9/28/17</a:t>
             </a:fld>
             <a:endParaRPr lang="en-US"/>
           </a:p>
@@ -1427,7 +1514,7 @@
           <a:p>
             <a:fld id="{F6764DA5-CD3D-4590-A511-FCD3BC7A793E}" type="datetimeFigureOut">
               <a:rPr lang="en-US" smtClean="0"/>
-              <a:t>9/27/17</a:t>
+              <a:t>9/28/17</a:t>
             </a:fld>
             <a:endParaRPr lang="en-US"/>
           </a:p>
@@ -1597,7 +1684,7 @@
           <a:p>
             <a:fld id="{82F5661D-6934-4B32-B92C-470368BF1EC6}" type="datetimeFigureOut">
               <a:rPr lang="en-US" smtClean="0"/>
-              <a:t>9/27/17</a:t>
+              <a:t>9/28/17</a:t>
             </a:fld>
             <a:endParaRPr lang="en-US"/>
           </a:p>
@@ -1918,7 +2005,7 @@
           <a:p>
             <a:fld id="{C6F822A4-8DA6-4447-9B1F-C5DB58435268}" type="datetimeFigureOut">
               <a:rPr lang="en-US" smtClean="0"/>
-              <a:t>9/27/17</a:t>
+              <a:t>9/28/17</a:t>
             </a:fld>
             <a:endParaRPr lang="en-US" dirty="0"/>
           </a:p>
@@ -2379,7 +2466,7 @@
           <a:p>
             <a:fld id="{E548D31E-DCDA-41A7-9C67-C4B11B94D21D}" type="datetimeFigureOut">
               <a:rPr lang="en-US" smtClean="0"/>
-              <a:t>9/27/17</a:t>
+              <a:t>9/28/17</a:t>
             </a:fld>
             <a:endParaRPr lang="en-US"/>
           </a:p>
@@ -2790,7 +2877,7 @@
           <a:p>
             <a:fld id="{9B3762C0-B258-48F1-ADE6-176B4174CCDD}" type="datetimeFigureOut">
               <a:rPr lang="en-US" smtClean="0"/>
-              <a:t>9/27/17</a:t>
+              <a:t>9/28/17</a:t>
             </a:fld>
             <a:endParaRPr lang="en-US"/>
           </a:p>
@@ -2908,7 +2995,7 @@
           <a:p>
             <a:fld id="{677919A6-33EB-49BD-A62F-1FA56B9F9712}" type="datetimeFigureOut">
               <a:rPr lang="en-US" smtClean="0"/>
-              <a:t>9/27/17</a:t>
+              <a:t>9/28/17</a:t>
             </a:fld>
             <a:endParaRPr lang="en-US"/>
           </a:p>
@@ -3026,7 +3113,7 @@
           <a:p>
             <a:fld id="{CA4E7D1B-D673-4CF6-8672-009D42ABD2A0}" type="datetimeFigureOut">
               <a:rPr lang="en-US" smtClean="0"/>
-              <a:t>9/27/17</a:t>
+              <a:t>9/28/17</a:t>
             </a:fld>
             <a:endParaRPr lang="en-US"/>
           </a:p>
@@ -3384,7 +3471,7 @@
           <a:p>
             <a:fld id="{DA16AA21-1863-4931-97CB-99D0A168701B}" type="datetimeFigureOut">
               <a:rPr lang="en-US" smtClean="0"/>
-              <a:t>9/27/17</a:t>
+              <a:t>9/28/17</a:t>
             </a:fld>
             <a:endParaRPr lang="en-US"/>
           </a:p>
@@ -3891,7 +3978,7 @@
           <a:p>
             <a:fld id="{3772C379-9A7C-4C87-A116-CBE9F58B04C5}" type="datetimeFigureOut">
               <a:rPr lang="en-US" smtClean="0"/>
-              <a:t>9/27/17</a:t>
+              <a:t>9/28/17</a:t>
             </a:fld>
             <a:endParaRPr lang="en-US"/>
           </a:p>
@@ -4246,7 +4333,7 @@
           <a:p>
             <a:fld id="{8664C608-40B1-4030-A28D-5B74BC98ADCE}" type="datetimeFigureOut">
               <a:rPr lang="en-US" smtClean="0"/>
-              <a:t>9/27/17</a:t>
+              <a:t>9/28/17</a:t>
             </a:fld>
             <a:endParaRPr lang="en-US" dirty="0"/>
           </a:p>
@@ -4900,7 +4987,7 @@
       </p:grpSpPr>
       <p:sp>
         <p:nvSpPr>
-          <p:cNvPr id="2" name="Title 1"/>
+          <p:cNvPr id="4" name="Title 3"/>
           <p:cNvSpPr>
             <a:spLocks noGrp="1"/>
           </p:cNvSpPr>
@@ -4908,61 +4995,12 @@
             <p:ph type="ctrTitle"/>
           </p:nvPr>
         </p:nvSpPr>
-        <p:spPr>
-          <a:xfrm>
-            <a:off x="76200" y="1432223"/>
-            <a:ext cx="12115799" cy="3035808"/>
-          </a:xfrm>
-        </p:spPr>
+        <p:spPr/>
         <p:txBody>
           <a:bodyPr/>
           <a:lstStyle/>
           <a:p>
-            <a:pPr algn="ctr"/>
-            <a:r>
-              <a:rPr lang="en-US" sz="4400" dirty="0" smtClean="0">
-                <a:solidFill>
-                  <a:srgbClr val="7030A0"/>
-                </a:solidFill>
-              </a:rPr>
-              <a:t>SYSTEM.OUT.PRINTLN</a:t>
-            </a:r>
-            <a:r>
-              <a:rPr lang="en-US" sz="4400" dirty="0" smtClean="0"/>
-              <a:t>(</a:t>
-            </a:r>
-            <a:r>
-              <a:rPr lang="en-US" sz="4400" dirty="0" smtClean="0">
-                <a:solidFill>
-                  <a:srgbClr val="00B050"/>
-                </a:solidFill>
-              </a:rPr>
-              <a:t>“DAVE’S BLACKJACK PRESENTATION”</a:t>
-            </a:r>
-            <a:r>
-              <a:rPr lang="en-US" sz="4400" dirty="0" smtClean="0"/>
-              <a:t>);</a:t>
-            </a:r>
-            <a:endParaRPr lang="en-US" sz="4400" dirty="0"/>
-          </a:p>
-        </p:txBody>
-      </p:sp>
-      <p:sp>
-        <p:nvSpPr>
-          <p:cNvPr id="3" name="Subtitle 2"/>
-          <p:cNvSpPr>
-            <a:spLocks noGrp="1"/>
-          </p:cNvSpPr>
-          <p:nvPr>
-            <p:ph type="subTitle" idx="1"/>
-          </p:nvPr>
-        </p:nvSpPr>
-        <p:spPr/>
-        <p:txBody>
-          <a:bodyPr/>
-          <a:lstStyle/>
-          <a:p>
-            <a:endParaRPr lang="en-US" dirty="0"/>
+            <a:endParaRPr lang="en-US"/>
           </a:p>
         </p:txBody>
       </p:sp>
@@ -4982,6 +5020,328 @@
         <p:cTn id="1" dur="indefinite" restart="never" nodeType="tmRoot"/>
       </p:par>
     </p:tnLst>
+  </p:timing>
+</p:sld>
+</file>
+
+<file path=ppt/slides/slide10.xml><?xml version="1.0" encoding="utf-8"?>
+<p:sld xmlns:a="http://schemas.openxmlformats.org/drawingml/2006/main" xmlns:r="http://schemas.openxmlformats.org/officeDocument/2006/relationships" xmlns:p="http://schemas.openxmlformats.org/presentationml/2006/main">
+  <p:cSld>
+    <p:spTree>
+      <p:nvGrpSpPr>
+        <p:cNvPr id="1" name=""/>
+        <p:cNvGrpSpPr/>
+        <p:nvPr/>
+      </p:nvGrpSpPr>
+      <p:grpSpPr>
+        <a:xfrm>
+          <a:off x="0" y="0"/>
+          <a:ext cx="0" cy="0"/>
+          <a:chOff x="0" y="0"/>
+          <a:chExt cx="0" cy="0"/>
+        </a:xfrm>
+      </p:grpSpPr>
+      <p:sp>
+        <p:nvSpPr>
+          <p:cNvPr id="2" name="Title 1"/>
+          <p:cNvSpPr>
+            <a:spLocks noGrp="1"/>
+          </p:cNvSpPr>
+          <p:nvPr>
+            <p:ph type="ctrTitle"/>
+          </p:nvPr>
+        </p:nvSpPr>
+        <p:spPr>
+          <a:xfrm>
+            <a:off x="272143" y="1432223"/>
+            <a:ext cx="11680371" cy="3035808"/>
+          </a:xfrm>
+        </p:spPr>
+        <p:txBody>
+          <a:bodyPr/>
+          <a:lstStyle/>
+          <a:p>
+            <a:pPr algn="ctr"/>
+            <a:r>
+              <a:rPr lang="en-US" sz="10400" dirty="0" smtClean="0"/>
+              <a:t>THANK YOU VERY MUCH!</a:t>
+            </a:r>
+            <a:endParaRPr lang="en-US" sz="10400" dirty="0"/>
+          </a:p>
+        </p:txBody>
+      </p:sp>
+      <p:sp>
+        <p:nvSpPr>
+          <p:cNvPr id="3" name="Subtitle 2"/>
+          <p:cNvSpPr>
+            <a:spLocks noGrp="1"/>
+          </p:cNvSpPr>
+          <p:nvPr>
+            <p:ph type="subTitle" idx="1"/>
+          </p:nvPr>
+        </p:nvSpPr>
+        <p:spPr>
+          <a:xfrm>
+            <a:off x="1069848" y="4468030"/>
+            <a:ext cx="7891272" cy="990937"/>
+          </a:xfrm>
+        </p:spPr>
+        <p:txBody>
+          <a:bodyPr/>
+          <a:lstStyle/>
+          <a:p>
+            <a:r>
+              <a:rPr lang="en-US" dirty="0" smtClean="0">
+                <a:solidFill>
+                  <a:srgbClr val="00B050"/>
+                </a:solidFill>
+              </a:rPr>
+              <a:t>puts “Any questions?”</a:t>
+            </a:r>
+            <a:endParaRPr lang="en-US" dirty="0">
+              <a:solidFill>
+                <a:srgbClr val="00B050"/>
+              </a:solidFill>
+            </a:endParaRPr>
+          </a:p>
+        </p:txBody>
+      </p:sp>
+    </p:spTree>
+    <p:extLst>
+      <p:ext uri="{BB962C8B-B14F-4D97-AF65-F5344CB8AC3E}">
+        <p14:creationId xmlns:p14="http://schemas.microsoft.com/office/powerpoint/2010/main" val="1279007067"/>
+      </p:ext>
+    </p:extLst>
+  </p:cSld>
+  <p:clrMapOvr>
+    <a:masterClrMapping/>
+  </p:clrMapOvr>
+  <p:timing>
+    <p:tnLst>
+      <p:par>
+        <p:cTn id="1" dur="indefinite" restart="never" nodeType="tmRoot">
+          <p:childTnLst>
+            <p:seq concurrent="1" nextAc="seek">
+              <p:cTn id="2" dur="indefinite" nodeType="mainSeq">
+                <p:childTnLst>
+                  <p:par>
+                    <p:cTn id="3" fill="hold">
+                      <p:stCondLst>
+                        <p:cond delay="indefinite"/>
+                        <p:cond evt="onBegin" delay="0">
+                          <p:tn val="2"/>
+                        </p:cond>
+                      </p:stCondLst>
+                      <p:childTnLst>
+                        <p:par>
+                          <p:cTn id="4" fill="hold">
+                            <p:stCondLst>
+                              <p:cond delay="0"/>
+                            </p:stCondLst>
+                            <p:childTnLst>
+                              <p:par>
+                                <p:cTn id="5" presetID="5" presetClass="entr" presetSubtype="10" fill="hold" grpId="0" nodeType="withEffect">
+                                  <p:stCondLst>
+                                    <p:cond delay="0"/>
+                                  </p:stCondLst>
+                                  <p:childTnLst>
+                                    <p:set>
+                                      <p:cBhvr>
+                                        <p:cTn id="6" dur="1" fill="hold">
+                                          <p:stCondLst>
+                                            <p:cond delay="0"/>
+                                          </p:stCondLst>
+                                        </p:cTn>
+                                        <p:tgtEl>
+                                          <p:spTgt spid="2"/>
+                                        </p:tgtEl>
+                                        <p:attrNameLst>
+                                          <p:attrName>style.visibility</p:attrName>
+                                        </p:attrNameLst>
+                                      </p:cBhvr>
+                                      <p:to>
+                                        <p:strVal val="visible"/>
+                                      </p:to>
+                                    </p:set>
+                                    <p:animEffect transition="in" filter="checkerboard(across)">
+                                      <p:cBhvr>
+                                        <p:cTn id="7" dur="500"/>
+                                        <p:tgtEl>
+                                          <p:spTgt spid="2"/>
+                                        </p:tgtEl>
+                                      </p:cBhvr>
+                                    </p:animEffect>
+                                  </p:childTnLst>
+                                </p:cTn>
+                              </p:par>
+                            </p:childTnLst>
+                          </p:cTn>
+                        </p:par>
+                        <p:par>
+                          <p:cTn id="8" fill="hold">
+                            <p:stCondLst>
+                              <p:cond delay="500"/>
+                            </p:stCondLst>
+                            <p:childTnLst>
+                              <p:par>
+                                <p:cTn id="9" presetID="37" presetClass="entr" presetSubtype="0" fill="hold" grpId="0" nodeType="afterEffect">
+                                  <p:stCondLst>
+                                    <p:cond delay="0"/>
+                                  </p:stCondLst>
+                                  <p:childTnLst>
+                                    <p:set>
+                                      <p:cBhvr>
+                                        <p:cTn id="10" dur="1" fill="hold">
+                                          <p:stCondLst>
+                                            <p:cond delay="0"/>
+                                          </p:stCondLst>
+                                        </p:cTn>
+                                        <p:tgtEl>
+                                          <p:spTgt spid="3">
+                                            <p:txEl>
+                                              <p:pRg st="0" end="0"/>
+                                            </p:txEl>
+                                          </p:spTgt>
+                                        </p:tgtEl>
+                                        <p:attrNameLst>
+                                          <p:attrName>style.visibility</p:attrName>
+                                        </p:attrNameLst>
+                                      </p:cBhvr>
+                                      <p:to>
+                                        <p:strVal val="visible"/>
+                                      </p:to>
+                                    </p:set>
+                                    <p:animEffect transition="in" filter="fade">
+                                      <p:cBhvr>
+                                        <p:cTn id="11" dur="1000"/>
+                                        <p:tgtEl>
+                                          <p:spTgt spid="3">
+                                            <p:txEl>
+                                              <p:pRg st="0" end="0"/>
+                                            </p:txEl>
+                                          </p:spTgt>
+                                        </p:tgtEl>
+                                      </p:cBhvr>
+                                    </p:animEffect>
+                                    <p:anim calcmode="lin" valueType="num">
+                                      <p:cBhvr>
+                                        <p:cTn id="12" dur="1000" fill="hold"/>
+                                        <p:tgtEl>
+                                          <p:spTgt spid="3">
+                                            <p:txEl>
+                                              <p:pRg st="0" end="0"/>
+                                            </p:txEl>
+                                          </p:spTgt>
+                                        </p:tgtEl>
+                                        <p:attrNameLst>
+                                          <p:attrName>ppt_x</p:attrName>
+                                        </p:attrNameLst>
+                                      </p:cBhvr>
+                                      <p:tavLst>
+                                        <p:tav tm="0">
+                                          <p:val>
+                                            <p:strVal val="#ppt_x"/>
+                                          </p:val>
+                                        </p:tav>
+                                        <p:tav tm="100000">
+                                          <p:val>
+                                            <p:strVal val="#ppt_x"/>
+                                          </p:val>
+                                        </p:tav>
+                                      </p:tavLst>
+                                    </p:anim>
+                                    <p:anim calcmode="lin" valueType="num">
+                                      <p:cBhvr>
+                                        <p:cTn id="13" dur="900" decel="100000" fill="hold"/>
+                                        <p:tgtEl>
+                                          <p:spTgt spid="3">
+                                            <p:txEl>
+                                              <p:pRg st="0" end="0"/>
+                                            </p:txEl>
+                                          </p:spTgt>
+                                        </p:tgtEl>
+                                        <p:attrNameLst>
+                                          <p:attrName>ppt_y</p:attrName>
+                                        </p:attrNameLst>
+                                      </p:cBhvr>
+                                      <p:tavLst>
+                                        <p:tav tm="0">
+                                          <p:val>
+                                            <p:strVal val="#ppt_y+1"/>
+                                          </p:val>
+                                        </p:tav>
+                                        <p:tav tm="100000">
+                                          <p:val>
+                                            <p:strVal val="#ppt_y-.03"/>
+                                          </p:val>
+                                        </p:tav>
+                                      </p:tavLst>
+                                    </p:anim>
+                                    <p:anim calcmode="lin" valueType="num">
+                                      <p:cBhvr>
+                                        <p:cTn id="14" dur="100" accel="100000" fill="hold">
+                                          <p:stCondLst>
+                                            <p:cond delay="900"/>
+                                          </p:stCondLst>
+                                        </p:cTn>
+                                        <p:tgtEl>
+                                          <p:spTgt spid="3">
+                                            <p:txEl>
+                                              <p:pRg st="0" end="0"/>
+                                            </p:txEl>
+                                          </p:spTgt>
+                                        </p:tgtEl>
+                                        <p:attrNameLst>
+                                          <p:attrName>ppt_y</p:attrName>
+                                        </p:attrNameLst>
+                                      </p:cBhvr>
+                                      <p:tavLst>
+                                        <p:tav tm="0">
+                                          <p:val>
+                                            <p:strVal val="#ppt_y-.03"/>
+                                          </p:val>
+                                        </p:tav>
+                                        <p:tav tm="100000">
+                                          <p:val>
+                                            <p:strVal val="#ppt_y"/>
+                                          </p:val>
+                                        </p:tav>
+                                      </p:tavLst>
+                                    </p:anim>
+                                  </p:childTnLst>
+                                </p:cTn>
+                              </p:par>
+                            </p:childTnLst>
+                          </p:cTn>
+                        </p:par>
+                      </p:childTnLst>
+                    </p:cTn>
+                  </p:par>
+                </p:childTnLst>
+              </p:cTn>
+              <p:prevCondLst>
+                <p:cond evt="onPrev" delay="0">
+                  <p:tgtEl>
+                    <p:sldTgt/>
+                  </p:tgtEl>
+                </p:cond>
+              </p:prevCondLst>
+              <p:nextCondLst>
+                <p:cond evt="onNext" delay="0">
+                  <p:tgtEl>
+                    <p:sldTgt/>
+                  </p:tgtEl>
+                </p:cond>
+              </p:nextCondLst>
+            </p:seq>
+          </p:childTnLst>
+        </p:cTn>
+      </p:par>
+    </p:tnLst>
+    <p:bldLst>
+      <p:bldP spid="2" grpId="0"/>
+      <p:bldP spid="3" grpId="0" build="p"/>
+    </p:bldLst>
   </p:timing>
 </p:sld>
 </file>
@@ -5013,16 +5373,42 @@
             <p:ph type="ctrTitle"/>
           </p:nvPr>
         </p:nvSpPr>
-        <p:spPr/>
+        <p:spPr>
+          <a:xfrm>
+            <a:off x="76200" y="1432223"/>
+            <a:ext cx="12115799" cy="3035808"/>
+          </a:xfrm>
+        </p:spPr>
         <p:txBody>
           <a:bodyPr/>
           <a:lstStyle/>
           <a:p>
-            <a:r>
-              <a:rPr lang="en-US" dirty="0" smtClean="0"/>
-              <a:t>Wrote a lot of code</a:t>
-            </a:r>
-            <a:endParaRPr lang="en-US" dirty="0"/>
+            <a:pPr algn="ctr"/>
+            <a:r>
+              <a:rPr lang="en-US" sz="4400" dirty="0" smtClean="0">
+                <a:solidFill>
+                  <a:srgbClr val="7030A0"/>
+                </a:solidFill>
+              </a:rPr>
+              <a:t>SYSTEM.OUT.PRINTLN</a:t>
+            </a:r>
+            <a:r>
+              <a:rPr lang="en-US" sz="4400" dirty="0" smtClean="0"/>
+              <a:t>(</a:t>
+            </a:r>
+            <a:r>
+              <a:rPr lang="en-US" sz="4400" dirty="0" smtClean="0">
+                <a:solidFill>
+                  <a:srgbClr val="00B050"/>
+                </a:solidFill>
+              </a:rPr>
+              <a:t>“DAVE’S BLACKJACK PRESENTATION”</a:t>
+            </a:r>
+            <a:r>
+              <a:rPr lang="en-US" sz="4400" dirty="0" smtClean="0"/>
+              <a:t>);</a:t>
+            </a:r>
+            <a:endParaRPr lang="en-US" sz="4400" dirty="0"/>
           </a:p>
         </p:txBody>
       </p:sp>
@@ -5041,6 +5427,102 @@
           <a:bodyPr/>
           <a:lstStyle/>
           <a:p>
+            <a:endParaRPr lang="en-US" dirty="0"/>
+          </a:p>
+        </p:txBody>
+      </p:sp>
+    </p:spTree>
+    <p:extLst>
+      <p:ext uri="{BB962C8B-B14F-4D97-AF65-F5344CB8AC3E}">
+        <p14:creationId xmlns:p14="http://schemas.microsoft.com/office/powerpoint/2010/main" val="1266536598"/>
+      </p:ext>
+    </p:extLst>
+  </p:cSld>
+  <p:clrMapOvr>
+    <a:masterClrMapping/>
+  </p:clrMapOvr>
+  <p:timing>
+    <p:tnLst>
+      <p:par>
+        <p:cTn id="1" dur="indefinite" restart="never" nodeType="tmRoot"/>
+      </p:par>
+    </p:tnLst>
+  </p:timing>
+</p:sld>
+</file>
+
+<file path=ppt/slides/slide3.xml><?xml version="1.0" encoding="utf-8"?>
+<p:sld xmlns:a="http://schemas.openxmlformats.org/drawingml/2006/main" xmlns:r="http://schemas.openxmlformats.org/officeDocument/2006/relationships" xmlns:p="http://schemas.openxmlformats.org/presentationml/2006/main">
+  <p:cSld>
+    <p:spTree>
+      <p:nvGrpSpPr>
+        <p:cNvPr id="1" name=""/>
+        <p:cNvGrpSpPr/>
+        <p:nvPr/>
+      </p:nvGrpSpPr>
+      <p:grpSpPr>
+        <a:xfrm>
+          <a:off x="0" y="0"/>
+          <a:ext cx="0" cy="0"/>
+          <a:chOff x="0" y="0"/>
+          <a:chExt cx="0" cy="0"/>
+        </a:xfrm>
+      </p:grpSpPr>
+      <p:sp>
+        <p:nvSpPr>
+          <p:cNvPr id="2" name="Title 1"/>
+          <p:cNvSpPr>
+            <a:spLocks noGrp="1"/>
+          </p:cNvSpPr>
+          <p:nvPr>
+            <p:ph type="ctrTitle"/>
+          </p:nvPr>
+        </p:nvSpPr>
+        <p:spPr/>
+        <p:txBody>
+          <a:bodyPr/>
+          <a:lstStyle/>
+          <a:p>
+            <a:r>
+              <a:rPr lang="en-US" dirty="0" smtClean="0"/>
+              <a:t>CHOSE BLACKJACK</a:t>
+            </a:r>
+            <a:endParaRPr lang="en-US" dirty="0"/>
+          </a:p>
+        </p:txBody>
+      </p:sp>
+      <p:sp>
+        <p:nvSpPr>
+          <p:cNvPr id="3" name="Subtitle 2"/>
+          <p:cNvSpPr>
+            <a:spLocks noGrp="1"/>
+          </p:cNvSpPr>
+          <p:nvPr>
+            <p:ph type="subTitle" idx="1"/>
+          </p:nvPr>
+        </p:nvSpPr>
+        <p:spPr>
+          <a:xfrm>
+            <a:off x="1069847" y="4389120"/>
+            <a:ext cx="9086523" cy="1069848"/>
+          </a:xfrm>
+        </p:spPr>
+        <p:txBody>
+          <a:bodyPr>
+            <a:normAutofit/>
+          </a:bodyPr>
+          <a:lstStyle/>
+          <a:p>
+            <a:r>
+              <a:rPr lang="en-US" dirty="0" smtClean="0"/>
+              <a:t>Java / Terminal only</a:t>
+            </a:r>
+          </a:p>
+          <a:p>
+            <a:r>
+              <a:rPr lang="en-US" dirty="0" smtClean="0"/>
+              <a:t>I thought Android would take longer than a week to complete!</a:t>
+            </a:r>
             <a:endParaRPr lang="en-US" dirty="0"/>
           </a:p>
         </p:txBody>
@@ -5162,6 +5644,110 @@
                             </p:childTnLst>
                           </p:cTn>
                         </p:par>
+                        <p:par>
+                          <p:cTn id="10" fill="hold">
+                            <p:stCondLst>
+                              <p:cond delay="500"/>
+                            </p:stCondLst>
+                            <p:childTnLst>
+                              <p:par>
+                                <p:cTn id="11" presetID="9" presetClass="entr" presetSubtype="0" fill="hold" grpId="0" nodeType="afterEffect">
+                                  <p:stCondLst>
+                                    <p:cond delay="0"/>
+                                  </p:stCondLst>
+                                  <p:childTnLst>
+                                    <p:set>
+                                      <p:cBhvr>
+                                        <p:cTn id="12" dur="1" fill="hold">
+                                          <p:stCondLst>
+                                            <p:cond delay="0"/>
+                                          </p:stCondLst>
+                                        </p:cTn>
+                                        <p:tgtEl>
+                                          <p:spTgt spid="3">
+                                            <p:txEl>
+                                              <p:pRg st="0" end="0"/>
+                                            </p:txEl>
+                                          </p:spTgt>
+                                        </p:tgtEl>
+                                        <p:attrNameLst>
+                                          <p:attrName>style.visibility</p:attrName>
+                                        </p:attrNameLst>
+                                      </p:cBhvr>
+                                      <p:to>
+                                        <p:strVal val="visible"/>
+                                      </p:to>
+                                    </p:set>
+                                    <p:animEffect transition="in" filter="dissolve">
+                                      <p:cBhvr>
+                                        <p:cTn id="13" dur="500"/>
+                                        <p:tgtEl>
+                                          <p:spTgt spid="3">
+                                            <p:txEl>
+                                              <p:pRg st="0" end="0"/>
+                                            </p:txEl>
+                                          </p:spTgt>
+                                        </p:tgtEl>
+                                      </p:cBhvr>
+                                    </p:animEffect>
+                                  </p:childTnLst>
+                                </p:cTn>
+                              </p:par>
+                            </p:childTnLst>
+                          </p:cTn>
+                        </p:par>
+                        <p:par>
+                          <p:cTn id="14" fill="hold">
+                            <p:stCondLst>
+                              <p:cond delay="1000"/>
+                            </p:stCondLst>
+                            <p:childTnLst>
+                              <p:par>
+                                <p:cTn id="15" presetID="5" presetClass="entr" presetSubtype="10" fill="hold" grpId="0" nodeType="afterEffect">
+                                  <p:stCondLst>
+                                    <p:cond delay="0"/>
+                                  </p:stCondLst>
+                                  <p:childTnLst>
+                                    <p:set>
+                                      <p:cBhvr>
+                                        <p:cTn id="16" dur="1" fill="hold">
+                                          <p:stCondLst>
+                                            <p:cond delay="0"/>
+                                          </p:stCondLst>
+                                        </p:cTn>
+                                        <p:tgtEl>
+                                          <p:spTgt spid="3">
+                                            <p:txEl>
+                                              <p:pRg st="1" end="1"/>
+                                            </p:txEl>
+                                          </p:spTgt>
+                                        </p:tgtEl>
+                                        <p:attrNameLst>
+                                          <p:attrName>style.visibility</p:attrName>
+                                        </p:attrNameLst>
+                                      </p:cBhvr>
+                                      <p:to>
+                                        <p:strVal val="visible"/>
+                                      </p:to>
+                                    </p:set>
+                                    <p:animEffect transition="in" filter="checkerboard(across)">
+                                      <p:cBhvr>
+                                        <p:cTn id="17" dur="500"/>
+                                        <p:tgtEl>
+                                          <p:spTgt spid="3">
+                                            <p:txEl>
+                                              <p:pRg st="1" end="1"/>
+                                            </p:txEl>
+                                          </p:spTgt>
+                                        </p:tgtEl>
+                                      </p:cBhvr>
+                                    </p:animEffect>
+                                  </p:childTnLst>
+                                </p:cTn>
+                              </p:par>
+                            </p:childTnLst>
+                          </p:cTn>
+                        </p:par>
                       </p:childTnLst>
                     </p:cTn>
                   </p:par>
@@ -5188,12 +5774,13 @@
     </p:tnLst>
     <p:bldLst>
       <p:bldP spid="2" grpId="0"/>
+      <p:bldP spid="3" grpId="0" uiExpand="1" build="p"/>
     </p:bldLst>
   </p:timing>
 </p:sld>
 </file>
 
-<file path=ppt/slides/slide3.xml><?xml version="1.0" encoding="utf-8"?>
+<file path=ppt/slides/slide4.xml><?xml version="1.0" encoding="utf-8"?>
 <p:sld xmlns:a="http://schemas.openxmlformats.org/drawingml/2006/main" xmlns:r="http://schemas.openxmlformats.org/officeDocument/2006/relationships" xmlns:p="http://schemas.openxmlformats.org/presentationml/2006/main">
   <p:cSld>
     <p:spTree>
@@ -5227,7 +5814,7 @@
           <a:p>
             <a:r>
               <a:rPr lang="en-US" dirty="0" smtClean="0"/>
-              <a:t>It worked</a:t>
+              <a:t>Wrote a lot of code</a:t>
             </a:r>
             <a:endParaRPr lang="en-US" dirty="0"/>
           </a:p>
@@ -5248,6 +5835,356 @@
           <a:bodyPr/>
           <a:lstStyle/>
           <a:p>
+            <a:r>
+              <a:rPr lang="en-US" smtClean="0"/>
+              <a:t>(Tests were also written)</a:t>
+            </a:r>
+            <a:endParaRPr lang="en-US" dirty="0"/>
+          </a:p>
+        </p:txBody>
+      </p:sp>
+    </p:spTree>
+    <p:extLst>
+      <p:ext uri="{BB962C8B-B14F-4D97-AF65-F5344CB8AC3E}">
+        <p14:creationId xmlns:p14="http://schemas.microsoft.com/office/powerpoint/2010/main" val="1737982003"/>
+      </p:ext>
+    </p:extLst>
+  </p:cSld>
+  <p:clrMapOvr>
+    <a:masterClrMapping/>
+  </p:clrMapOvr>
+  <p:timing>
+    <p:tnLst>
+      <p:par>
+        <p:cTn id="1" dur="indefinite" restart="never" nodeType="tmRoot">
+          <p:childTnLst>
+            <p:seq concurrent="1" nextAc="seek">
+              <p:cTn id="2" dur="indefinite" nodeType="mainSeq">
+                <p:childTnLst>
+                  <p:par>
+                    <p:cTn id="3" fill="hold">
+                      <p:stCondLst>
+                        <p:cond delay="indefinite"/>
+                        <p:cond evt="onBegin" delay="0">
+                          <p:tn val="2"/>
+                        </p:cond>
+                      </p:stCondLst>
+                      <p:childTnLst>
+                        <p:par>
+                          <p:cTn id="4" fill="hold">
+                            <p:stCondLst>
+                              <p:cond delay="0"/>
+                            </p:stCondLst>
+                            <p:childTnLst>
+                              <p:par>
+                                <p:cTn id="5" presetID="42" presetClass="entr" presetSubtype="0" fill="hold" grpId="0" nodeType="withEffect">
+                                  <p:stCondLst>
+                                    <p:cond delay="0"/>
+                                  </p:stCondLst>
+                                  <p:childTnLst>
+                                    <p:set>
+                                      <p:cBhvr>
+                                        <p:cTn id="6" dur="1" fill="hold">
+                                          <p:stCondLst>
+                                            <p:cond delay="0"/>
+                                          </p:stCondLst>
+                                        </p:cTn>
+                                        <p:tgtEl>
+                                          <p:spTgt spid="2"/>
+                                        </p:tgtEl>
+                                        <p:attrNameLst>
+                                          <p:attrName>style.visibility</p:attrName>
+                                        </p:attrNameLst>
+                                      </p:cBhvr>
+                                      <p:to>
+                                        <p:strVal val="visible"/>
+                                      </p:to>
+                                    </p:set>
+                                    <p:animEffect transition="in" filter="fade">
+                                      <p:cBhvr>
+                                        <p:cTn id="7" dur="500"/>
+                                        <p:tgtEl>
+                                          <p:spTgt spid="2"/>
+                                        </p:tgtEl>
+                                      </p:cBhvr>
+                                    </p:animEffect>
+                                    <p:anim calcmode="lin" valueType="num">
+                                      <p:cBhvr>
+                                        <p:cTn id="8" dur="500" fill="hold"/>
+                                        <p:tgtEl>
+                                          <p:spTgt spid="2"/>
+                                        </p:tgtEl>
+                                        <p:attrNameLst>
+                                          <p:attrName>ppt_x</p:attrName>
+                                        </p:attrNameLst>
+                                      </p:cBhvr>
+                                      <p:tavLst>
+                                        <p:tav tm="0">
+                                          <p:val>
+                                            <p:strVal val="#ppt_x"/>
+                                          </p:val>
+                                        </p:tav>
+                                        <p:tav tm="100000">
+                                          <p:val>
+                                            <p:strVal val="#ppt_x"/>
+                                          </p:val>
+                                        </p:tav>
+                                      </p:tavLst>
+                                    </p:anim>
+                                    <p:anim calcmode="lin" valueType="num">
+                                      <p:cBhvr>
+                                        <p:cTn id="9" dur="500" fill="hold"/>
+                                        <p:tgtEl>
+                                          <p:spTgt spid="2"/>
+                                        </p:tgtEl>
+                                        <p:attrNameLst>
+                                          <p:attrName>ppt_y</p:attrName>
+                                        </p:attrNameLst>
+                                      </p:cBhvr>
+                                      <p:tavLst>
+                                        <p:tav tm="0">
+                                          <p:val>
+                                            <p:strVal val="#ppt_y+.1"/>
+                                          </p:val>
+                                        </p:tav>
+                                        <p:tav tm="100000">
+                                          <p:val>
+                                            <p:strVal val="#ppt_y"/>
+                                          </p:val>
+                                        </p:tav>
+                                      </p:tavLst>
+                                    </p:anim>
+                                  </p:childTnLst>
+                                </p:cTn>
+                              </p:par>
+                            </p:childTnLst>
+                          </p:cTn>
+                        </p:par>
+                        <p:par>
+                          <p:cTn id="10" fill="hold">
+                            <p:stCondLst>
+                              <p:cond delay="500"/>
+                            </p:stCondLst>
+                            <p:childTnLst>
+                              <p:par>
+                                <p:cTn id="11" presetID="3" presetClass="entr" presetSubtype="10" fill="hold" grpId="0" nodeType="afterEffect">
+                                  <p:stCondLst>
+                                    <p:cond delay="0"/>
+                                  </p:stCondLst>
+                                  <p:childTnLst>
+                                    <p:set>
+                                      <p:cBhvr>
+                                        <p:cTn id="12" dur="1" fill="hold">
+                                          <p:stCondLst>
+                                            <p:cond delay="0"/>
+                                          </p:stCondLst>
+                                        </p:cTn>
+                                        <p:tgtEl>
+                                          <p:spTgt spid="3">
+                                            <p:txEl>
+                                              <p:pRg st="0" end="0"/>
+                                            </p:txEl>
+                                          </p:spTgt>
+                                        </p:tgtEl>
+                                        <p:attrNameLst>
+                                          <p:attrName>style.visibility</p:attrName>
+                                        </p:attrNameLst>
+                                      </p:cBhvr>
+                                      <p:to>
+                                        <p:strVal val="visible"/>
+                                      </p:to>
+                                    </p:set>
+                                    <p:animEffect transition="in" filter="blinds(horizontal)">
+                                      <p:cBhvr>
+                                        <p:cTn id="13" dur="500"/>
+                                        <p:tgtEl>
+                                          <p:spTgt spid="3">
+                                            <p:txEl>
+                                              <p:pRg st="0" end="0"/>
+                                            </p:txEl>
+                                          </p:spTgt>
+                                        </p:tgtEl>
+                                      </p:cBhvr>
+                                    </p:animEffect>
+                                  </p:childTnLst>
+                                </p:cTn>
+                              </p:par>
+                            </p:childTnLst>
+                          </p:cTn>
+                        </p:par>
+                        <p:par>
+                          <p:cTn id="14" fill="hold">
+                            <p:stCondLst>
+                              <p:cond delay="1000"/>
+                            </p:stCondLst>
+                            <p:childTnLst>
+                              <p:par>
+                                <p:cTn id="15" presetID="6" presetClass="entr" presetSubtype="16" fill="hold" grpId="1" nodeType="afterEffect">
+                                  <p:stCondLst>
+                                    <p:cond delay="0"/>
+                                  </p:stCondLst>
+                                  <p:childTnLst>
+                                    <p:set>
+                                      <p:cBhvr>
+                                        <p:cTn id="16" dur="1" fill="hold">
+                                          <p:stCondLst>
+                                            <p:cond delay="0"/>
+                                          </p:stCondLst>
+                                        </p:cTn>
+                                        <p:tgtEl>
+                                          <p:spTgt spid="3">
+                                            <p:txEl>
+                                              <p:pRg st="0" end="0"/>
+                                            </p:txEl>
+                                          </p:spTgt>
+                                        </p:tgtEl>
+                                        <p:attrNameLst>
+                                          <p:attrName>style.visibility</p:attrName>
+                                        </p:attrNameLst>
+                                      </p:cBhvr>
+                                      <p:to>
+                                        <p:strVal val="visible"/>
+                                      </p:to>
+                                    </p:set>
+                                    <p:animEffect transition="in" filter="circle(in)">
+                                      <p:cBhvr>
+                                        <p:cTn id="17" dur="2000"/>
+                                        <p:tgtEl>
+                                          <p:spTgt spid="3">
+                                            <p:txEl>
+                                              <p:pRg st="0" end="0"/>
+                                            </p:txEl>
+                                          </p:spTgt>
+                                        </p:tgtEl>
+                                      </p:cBhvr>
+                                    </p:animEffect>
+                                  </p:childTnLst>
+                                </p:cTn>
+                              </p:par>
+                            </p:childTnLst>
+                          </p:cTn>
+                        </p:par>
+                      </p:childTnLst>
+                    </p:cTn>
+                  </p:par>
+                </p:childTnLst>
+              </p:cTn>
+              <p:prevCondLst>
+                <p:cond evt="onPrev" delay="0">
+                  <p:tgtEl>
+                    <p:sldTgt/>
+                  </p:tgtEl>
+                </p:cond>
+              </p:prevCondLst>
+              <p:nextCondLst>
+                <p:cond evt="onNext" delay="0">
+                  <p:tgtEl>
+                    <p:sldTgt/>
+                  </p:tgtEl>
+                </p:cond>
+              </p:nextCondLst>
+            </p:seq>
+          </p:childTnLst>
+        </p:cTn>
+      </p:par>
+    </p:tnLst>
+    <p:bldLst>
+      <p:bldP spid="2" grpId="0"/>
+      <p:bldP spid="3" grpId="0" build="p"/>
+      <p:bldP spid="3" grpId="1" build="p"/>
+    </p:bldLst>
+  </p:timing>
+</p:sld>
+</file>
+
+<file path=ppt/slides/slide5.xml><?xml version="1.0" encoding="utf-8"?>
+<p:sld xmlns:a="http://schemas.openxmlformats.org/drawingml/2006/main" xmlns:r="http://schemas.openxmlformats.org/officeDocument/2006/relationships" xmlns:p="http://schemas.openxmlformats.org/presentationml/2006/main">
+  <p:cSld>
+    <p:spTree>
+      <p:nvGrpSpPr>
+        <p:cNvPr id="1" name=""/>
+        <p:cNvGrpSpPr/>
+        <p:nvPr/>
+      </p:nvGrpSpPr>
+      <p:grpSpPr>
+        <a:xfrm>
+          <a:off x="0" y="0"/>
+          <a:ext cx="0" cy="0"/>
+          <a:chOff x="0" y="0"/>
+          <a:chExt cx="0" cy="0"/>
+        </a:xfrm>
+      </p:grpSpPr>
+      <p:sp>
+        <p:nvSpPr>
+          <p:cNvPr id="2" name="Title 1"/>
+          <p:cNvSpPr>
+            <a:spLocks noGrp="1"/>
+          </p:cNvSpPr>
+          <p:nvPr>
+            <p:ph type="ctrTitle"/>
+          </p:nvPr>
+        </p:nvSpPr>
+        <p:spPr/>
+        <p:txBody>
+          <a:bodyPr/>
+          <a:lstStyle/>
+          <a:p>
+            <a:r>
+              <a:rPr lang="en-US" dirty="0" smtClean="0"/>
+              <a:t>CODE</a:t>
+            </a:r>
+            <a:r>
+              <a:rPr lang="en-US" dirty="0" smtClean="0"/>
+              <a:t> worked!</a:t>
+            </a:r>
+            <a:endParaRPr lang="en-US" dirty="0"/>
+          </a:p>
+        </p:txBody>
+      </p:sp>
+      <p:sp>
+        <p:nvSpPr>
+          <p:cNvPr id="3" name="Subtitle 2"/>
+          <p:cNvSpPr>
+            <a:spLocks noGrp="1"/>
+          </p:cNvSpPr>
+          <p:nvPr>
+            <p:ph type="subTitle" idx="1"/>
+          </p:nvPr>
+        </p:nvSpPr>
+        <p:spPr>
+          <a:xfrm>
+            <a:off x="1069848" y="4389119"/>
+            <a:ext cx="7891272" cy="1881051"/>
+          </a:xfrm>
+        </p:spPr>
+        <p:txBody>
+          <a:bodyPr>
+            <a:normAutofit/>
+          </a:bodyPr>
+          <a:lstStyle/>
+          <a:p>
+            <a:r>
+              <a:rPr lang="en-US" dirty="0" smtClean="0"/>
+              <a:t>Blackjack was played in Terminal.</a:t>
+            </a:r>
+          </a:p>
+          <a:p>
+            <a:r>
+              <a:rPr lang="en-US" dirty="0" smtClean="0"/>
+              <a:t>Players can be Human, Bot.</a:t>
+            </a:r>
+          </a:p>
+          <a:p>
+            <a:r>
+              <a:rPr lang="en-US" dirty="0" smtClean="0"/>
+              <a:t>The dealer is a different Bot.</a:t>
+            </a:r>
+          </a:p>
+          <a:p>
+            <a:r>
+              <a:rPr lang="en-US" dirty="0" smtClean="0"/>
+              <a:t>Various options in terms of decks and cards</a:t>
+            </a:r>
             <a:endParaRPr lang="en-US" dirty="0"/>
           </a:p>
         </p:txBody>
@@ -5392,6 +6329,382 @@
                             </p:childTnLst>
                           </p:cTn>
                         </p:par>
+                        <p:par>
+                          <p:cTn id="11" fill="hold">
+                            <p:stCondLst>
+                              <p:cond delay="500"/>
+                            </p:stCondLst>
+                            <p:childTnLst>
+                              <p:par>
+                                <p:cTn id="12" presetID="2" presetClass="entr" presetSubtype="4" fill="hold" grpId="0" nodeType="afterEffect">
+                                  <p:stCondLst>
+                                    <p:cond delay="0"/>
+                                  </p:stCondLst>
+                                  <p:childTnLst>
+                                    <p:set>
+                                      <p:cBhvr>
+                                        <p:cTn id="13" dur="1" fill="hold">
+                                          <p:stCondLst>
+                                            <p:cond delay="0"/>
+                                          </p:stCondLst>
+                                        </p:cTn>
+                                        <p:tgtEl>
+                                          <p:spTgt spid="3">
+                                            <p:txEl>
+                                              <p:pRg st="0" end="0"/>
+                                            </p:txEl>
+                                          </p:spTgt>
+                                        </p:tgtEl>
+                                        <p:attrNameLst>
+                                          <p:attrName>style.visibility</p:attrName>
+                                        </p:attrNameLst>
+                                      </p:cBhvr>
+                                      <p:to>
+                                        <p:strVal val="visible"/>
+                                      </p:to>
+                                    </p:set>
+                                    <p:anim calcmode="lin" valueType="num">
+                                      <p:cBhvr additive="base">
+                                        <p:cTn id="14" dur="500" fill="hold"/>
+                                        <p:tgtEl>
+                                          <p:spTgt spid="3">
+                                            <p:txEl>
+                                              <p:pRg st="0" end="0"/>
+                                            </p:txEl>
+                                          </p:spTgt>
+                                        </p:tgtEl>
+                                        <p:attrNameLst>
+                                          <p:attrName>ppt_x</p:attrName>
+                                        </p:attrNameLst>
+                                      </p:cBhvr>
+                                      <p:tavLst>
+                                        <p:tav tm="0">
+                                          <p:val>
+                                            <p:strVal val="#ppt_x"/>
+                                          </p:val>
+                                        </p:tav>
+                                        <p:tav tm="100000">
+                                          <p:val>
+                                            <p:strVal val="#ppt_x"/>
+                                          </p:val>
+                                        </p:tav>
+                                      </p:tavLst>
+                                    </p:anim>
+                                    <p:anim calcmode="lin" valueType="num">
+                                      <p:cBhvr additive="base">
+                                        <p:cTn id="15" dur="500" fill="hold"/>
+                                        <p:tgtEl>
+                                          <p:spTgt spid="3">
+                                            <p:txEl>
+                                              <p:pRg st="0" end="0"/>
+                                            </p:txEl>
+                                          </p:spTgt>
+                                        </p:tgtEl>
+                                        <p:attrNameLst>
+                                          <p:attrName>ppt_y</p:attrName>
+                                        </p:attrNameLst>
+                                      </p:cBhvr>
+                                      <p:tavLst>
+                                        <p:tav tm="0">
+                                          <p:val>
+                                            <p:strVal val="1+#ppt_h/2"/>
+                                          </p:val>
+                                        </p:tav>
+                                        <p:tav tm="100000">
+                                          <p:val>
+                                            <p:strVal val="#ppt_y"/>
+                                          </p:val>
+                                        </p:tav>
+                                      </p:tavLst>
+                                    </p:anim>
+                                  </p:childTnLst>
+                                </p:cTn>
+                              </p:par>
+                            </p:childTnLst>
+                          </p:cTn>
+                        </p:par>
+                        <p:par>
+                          <p:cTn id="16" fill="hold">
+                            <p:stCondLst>
+                              <p:cond delay="1000"/>
+                            </p:stCondLst>
+                            <p:childTnLst>
+                              <p:par>
+                                <p:cTn id="17" presetID="2" presetClass="entr" presetSubtype="4" fill="hold" grpId="0" nodeType="afterEffect">
+                                  <p:stCondLst>
+                                    <p:cond delay="0"/>
+                                  </p:stCondLst>
+                                  <p:childTnLst>
+                                    <p:set>
+                                      <p:cBhvr>
+                                        <p:cTn id="18" dur="1" fill="hold">
+                                          <p:stCondLst>
+                                            <p:cond delay="0"/>
+                                          </p:stCondLst>
+                                        </p:cTn>
+                                        <p:tgtEl>
+                                          <p:spTgt spid="3">
+                                            <p:txEl>
+                                              <p:pRg st="1" end="1"/>
+                                            </p:txEl>
+                                          </p:spTgt>
+                                        </p:tgtEl>
+                                        <p:attrNameLst>
+                                          <p:attrName>style.visibility</p:attrName>
+                                        </p:attrNameLst>
+                                      </p:cBhvr>
+                                      <p:to>
+                                        <p:strVal val="visible"/>
+                                      </p:to>
+                                    </p:set>
+                                    <p:anim calcmode="lin" valueType="num">
+                                      <p:cBhvr additive="base">
+                                        <p:cTn id="19" dur="500" fill="hold"/>
+                                        <p:tgtEl>
+                                          <p:spTgt spid="3">
+                                            <p:txEl>
+                                              <p:pRg st="1" end="1"/>
+                                            </p:txEl>
+                                          </p:spTgt>
+                                        </p:tgtEl>
+                                        <p:attrNameLst>
+                                          <p:attrName>ppt_x</p:attrName>
+                                        </p:attrNameLst>
+                                      </p:cBhvr>
+                                      <p:tavLst>
+                                        <p:tav tm="0">
+                                          <p:val>
+                                            <p:strVal val="#ppt_x"/>
+                                          </p:val>
+                                        </p:tav>
+                                        <p:tav tm="100000">
+                                          <p:val>
+                                            <p:strVal val="#ppt_x"/>
+                                          </p:val>
+                                        </p:tav>
+                                      </p:tavLst>
+                                    </p:anim>
+                                    <p:anim calcmode="lin" valueType="num">
+                                      <p:cBhvr additive="base">
+                                        <p:cTn id="20" dur="500" fill="hold"/>
+                                        <p:tgtEl>
+                                          <p:spTgt spid="3">
+                                            <p:txEl>
+                                              <p:pRg st="1" end="1"/>
+                                            </p:txEl>
+                                          </p:spTgt>
+                                        </p:tgtEl>
+                                        <p:attrNameLst>
+                                          <p:attrName>ppt_y</p:attrName>
+                                        </p:attrNameLst>
+                                      </p:cBhvr>
+                                      <p:tavLst>
+                                        <p:tav tm="0">
+                                          <p:val>
+                                            <p:strVal val="1+#ppt_h/2"/>
+                                          </p:val>
+                                        </p:tav>
+                                        <p:tav tm="100000">
+                                          <p:val>
+                                            <p:strVal val="#ppt_y"/>
+                                          </p:val>
+                                        </p:tav>
+                                      </p:tavLst>
+                                    </p:anim>
+                                  </p:childTnLst>
+                                </p:cTn>
+                              </p:par>
+                            </p:childTnLst>
+                          </p:cTn>
+                        </p:par>
+                        <p:par>
+                          <p:cTn id="21" fill="hold">
+                            <p:stCondLst>
+                              <p:cond delay="1500"/>
+                            </p:stCondLst>
+                            <p:childTnLst>
+                              <p:par>
+                                <p:cTn id="22" presetID="2" presetClass="entr" presetSubtype="4" fill="hold" grpId="0" nodeType="afterEffect">
+                                  <p:stCondLst>
+                                    <p:cond delay="0"/>
+                                  </p:stCondLst>
+                                  <p:childTnLst>
+                                    <p:set>
+                                      <p:cBhvr>
+                                        <p:cTn id="23" dur="1" fill="hold">
+                                          <p:stCondLst>
+                                            <p:cond delay="0"/>
+                                          </p:stCondLst>
+                                        </p:cTn>
+                                        <p:tgtEl>
+                                          <p:spTgt spid="3">
+                                            <p:txEl>
+                                              <p:pRg st="2" end="2"/>
+                                            </p:txEl>
+                                          </p:spTgt>
+                                        </p:tgtEl>
+                                        <p:attrNameLst>
+                                          <p:attrName>style.visibility</p:attrName>
+                                        </p:attrNameLst>
+                                      </p:cBhvr>
+                                      <p:to>
+                                        <p:strVal val="visible"/>
+                                      </p:to>
+                                    </p:set>
+                                    <p:anim calcmode="lin" valueType="num">
+                                      <p:cBhvr additive="base">
+                                        <p:cTn id="24" dur="500" fill="hold"/>
+                                        <p:tgtEl>
+                                          <p:spTgt spid="3">
+                                            <p:txEl>
+                                              <p:pRg st="2" end="2"/>
+                                            </p:txEl>
+                                          </p:spTgt>
+                                        </p:tgtEl>
+                                        <p:attrNameLst>
+                                          <p:attrName>ppt_x</p:attrName>
+                                        </p:attrNameLst>
+                                      </p:cBhvr>
+                                      <p:tavLst>
+                                        <p:tav tm="0">
+                                          <p:val>
+                                            <p:strVal val="#ppt_x"/>
+                                          </p:val>
+                                        </p:tav>
+                                        <p:tav tm="100000">
+                                          <p:val>
+                                            <p:strVal val="#ppt_x"/>
+                                          </p:val>
+                                        </p:tav>
+                                      </p:tavLst>
+                                    </p:anim>
+                                    <p:anim calcmode="lin" valueType="num">
+                                      <p:cBhvr additive="base">
+                                        <p:cTn id="25" dur="500" fill="hold"/>
+                                        <p:tgtEl>
+                                          <p:spTgt spid="3">
+                                            <p:txEl>
+                                              <p:pRg st="2" end="2"/>
+                                            </p:txEl>
+                                          </p:spTgt>
+                                        </p:tgtEl>
+                                        <p:attrNameLst>
+                                          <p:attrName>ppt_y</p:attrName>
+                                        </p:attrNameLst>
+                                      </p:cBhvr>
+                                      <p:tavLst>
+                                        <p:tav tm="0">
+                                          <p:val>
+                                            <p:strVal val="1+#ppt_h/2"/>
+                                          </p:val>
+                                        </p:tav>
+                                        <p:tav tm="100000">
+                                          <p:val>
+                                            <p:strVal val="#ppt_y"/>
+                                          </p:val>
+                                        </p:tav>
+                                      </p:tavLst>
+                                    </p:anim>
+                                  </p:childTnLst>
+                                </p:cTn>
+                              </p:par>
+                            </p:childTnLst>
+                          </p:cTn>
+                        </p:par>
+                        <p:par>
+                          <p:cTn id="26" fill="hold">
+                            <p:stCondLst>
+                              <p:cond delay="2000"/>
+                            </p:stCondLst>
+                            <p:childTnLst>
+                              <p:par>
+                                <p:cTn id="27" presetID="2" presetClass="entr" presetSubtype="4" fill="hold" grpId="0" nodeType="afterEffect">
+                                  <p:stCondLst>
+                                    <p:cond delay="0"/>
+                                  </p:stCondLst>
+                                  <p:childTnLst>
+                                    <p:set>
+                                      <p:cBhvr>
+                                        <p:cTn id="28" dur="1" fill="hold">
+                                          <p:stCondLst>
+                                            <p:cond delay="0"/>
+                                          </p:stCondLst>
+                                        </p:cTn>
+                                        <p:tgtEl>
+                                          <p:spTgt spid="3">
+                                            <p:txEl>
+                                              <p:pRg st="3" end="3"/>
+                                            </p:txEl>
+                                          </p:spTgt>
+                                        </p:tgtEl>
+                                        <p:attrNameLst>
+                                          <p:attrName>style.visibility</p:attrName>
+                                        </p:attrNameLst>
+                                      </p:cBhvr>
+                                      <p:to>
+                                        <p:strVal val="visible"/>
+                                      </p:to>
+                                    </p:set>
+                                    <p:anim calcmode="lin" valueType="num">
+                                      <p:cBhvr additive="base">
+                                        <p:cTn id="29" dur="500" fill="hold"/>
+                                        <p:tgtEl>
+                                          <p:spTgt spid="3">
+                                            <p:txEl>
+                                              <p:pRg st="3" end="3"/>
+                                            </p:txEl>
+                                          </p:spTgt>
+                                        </p:tgtEl>
+                                        <p:attrNameLst>
+                                          <p:attrName>ppt_x</p:attrName>
+                                        </p:attrNameLst>
+                                      </p:cBhvr>
+                                      <p:tavLst>
+                                        <p:tav tm="0">
+                                          <p:val>
+                                            <p:strVal val="#ppt_x"/>
+                                          </p:val>
+                                        </p:tav>
+                                        <p:tav tm="100000">
+                                          <p:val>
+                                            <p:strVal val="#ppt_x"/>
+                                          </p:val>
+                                        </p:tav>
+                                      </p:tavLst>
+                                    </p:anim>
+                                    <p:anim calcmode="lin" valueType="num">
+                                      <p:cBhvr additive="base">
+                                        <p:cTn id="30" dur="500" fill="hold"/>
+                                        <p:tgtEl>
+                                          <p:spTgt spid="3">
+                                            <p:txEl>
+                                              <p:pRg st="3" end="3"/>
+                                            </p:txEl>
+                                          </p:spTgt>
+                                        </p:tgtEl>
+                                        <p:attrNameLst>
+                                          <p:attrName>ppt_y</p:attrName>
+                                        </p:attrNameLst>
+                                      </p:cBhvr>
+                                      <p:tavLst>
+                                        <p:tav tm="0">
+                                          <p:val>
+                                            <p:strVal val="1+#ppt_h/2"/>
+                                          </p:val>
+                                        </p:tav>
+                                        <p:tav tm="100000">
+                                          <p:val>
+                                            <p:strVal val="#ppt_y"/>
+                                          </p:val>
+                                        </p:tav>
+                                      </p:tavLst>
+                                    </p:anim>
+                                  </p:childTnLst>
+                                </p:cTn>
+                              </p:par>
+                            </p:childTnLst>
+                          </p:cTn>
+                        </p:par>
                       </p:childTnLst>
                     </p:cTn>
                   </p:par>
@@ -5418,12 +6731,13 @@
     </p:tnLst>
     <p:bldLst>
       <p:bldP spid="2" grpId="1"/>
+      <p:bldP spid="3" grpId="0" build="p"/>
     </p:bldLst>
   </p:timing>
 </p:sld>
 </file>
 
-<file path=ppt/slides/slide4.xml><?xml version="1.0" encoding="utf-8"?>
+<file path=ppt/slides/slide6.xml><?xml version="1.0" encoding="utf-8"?>
 <p:sld xmlns:a="http://schemas.openxmlformats.org/drawingml/2006/main" xmlns:r="http://schemas.openxmlformats.org/officeDocument/2006/relationships" xmlns:p="http://schemas.openxmlformats.org/presentationml/2006/main">
   <p:cSld>
     <p:spTree>
@@ -5457,7 +6771,7 @@
           <a:p>
             <a:r>
               <a:rPr lang="en-US" dirty="0" smtClean="0"/>
-              <a:t>TESTED IT</a:t>
+              <a:t>WROTE TESTS</a:t>
             </a:r>
             <a:endParaRPr lang="en-US" dirty="0"/>
           </a:p>
@@ -5478,6 +6792,14 @@
           <a:bodyPr/>
           <a:lstStyle/>
           <a:p>
+            <a:r>
+              <a:rPr lang="en-US" smtClean="0"/>
+              <a:t>(Naturally! </a:t>
+            </a:r>
+            <a:r>
+              <a:rPr lang="en-US" dirty="0" smtClean="0"/>
+              <a:t>Who wouldn’t?)</a:t>
+            </a:r>
             <a:endParaRPr lang="en-US" dirty="0"/>
           </a:p>
         </p:txBody>
@@ -5663,6 +6985,58 @@
                             </p:childTnLst>
                           </p:cTn>
                         </p:par>
+                        <p:par>
+                          <p:cTn id="12" fill="hold">
+                            <p:stCondLst>
+                              <p:cond delay="950"/>
+                            </p:stCondLst>
+                            <p:childTnLst>
+                              <p:par>
+                                <p:cTn id="13" presetID="18" presetClass="entr" presetSubtype="12" fill="hold" grpId="1" nodeType="afterEffect">
+                                  <p:stCondLst>
+                                    <p:cond delay="0"/>
+                                  </p:stCondLst>
+                                  <p:childTnLst>
+                                    <p:set>
+                                      <p:cBhvr>
+                                        <p:cTn id="14" dur="1" fill="hold">
+                                          <p:stCondLst>
+                                            <p:cond delay="0"/>
+                                          </p:stCondLst>
+                                        </p:cTn>
+                                        <p:tgtEl>
+                                          <p:spTgt spid="3">
+                                            <p:txEl>
+                                              <p:pRg st="0" end="0"/>
+                                            </p:txEl>
+                                          </p:spTgt>
+                                        </p:tgtEl>
+                                        <p:attrNameLst>
+                                          <p:attrName>style.visibility</p:attrName>
+                                        </p:attrNameLst>
+                                      </p:cBhvr>
+                                      <p:to>
+                                        <p:strVal val="visible"/>
+                                      </p:to>
+                                    </p:set>
+                                    <p:animEffect transition="in" filter="strips(downLeft)">
+                                      <p:cBhvr>
+                                        <p:cTn id="15" dur="500"/>
+                                        <p:tgtEl>
+                                          <p:spTgt spid="3">
+                                            <p:txEl>
+                                              <p:pRg st="0" end="0"/>
+                                            </p:txEl>
+                                          </p:spTgt>
+                                        </p:tgtEl>
+                                      </p:cBhvr>
+                                    </p:animEffect>
+                                  </p:childTnLst>
+                                </p:cTn>
+                              </p:par>
+                            </p:childTnLst>
+                          </p:cTn>
+                        </p:par>
                       </p:childTnLst>
                     </p:cTn>
                   </p:par>
@@ -5689,12 +7063,13 @@
     </p:tnLst>
     <p:bldLst>
       <p:bldP spid="2" grpId="1"/>
+      <p:bldP spid="3" grpId="1" build="p"/>
     </p:bldLst>
   </p:timing>
 </p:sld>
 </file>
 
-<file path=ppt/slides/slide5.xml><?xml version="1.0" encoding="utf-8"?>
+<file path=ppt/slides/slide7.xml><?xml version="1.0" encoding="utf-8"?>
 <p:sld xmlns:a="http://schemas.openxmlformats.org/drawingml/2006/main" xmlns:r="http://schemas.openxmlformats.org/officeDocument/2006/relationships" xmlns:p="http://schemas.openxmlformats.org/presentationml/2006/main">
   <p:cSld>
     <p:spTree>
@@ -5728,7 +7103,11 @@
           <a:p>
             <a:r>
               <a:rPr lang="en-US" dirty="0" smtClean="0"/>
-              <a:t>GOOD COVERAGE (PROBABLY)</a:t>
+              <a:t>GOOD </a:t>
+            </a:r>
+            <a:r>
+              <a:rPr lang="en-US" dirty="0" smtClean="0"/>
+              <a:t>COVERAGE</a:t>
             </a:r>
             <a:endParaRPr lang="en-US" dirty="0"/>
           </a:p>
@@ -5749,6 +7128,20 @@
           <a:bodyPr/>
           <a:lstStyle/>
           <a:p>
+            <a:r>
+              <a:rPr lang="en-US" dirty="0"/>
+              <a:t>(Especially more basic </a:t>
+            </a:r>
+            <a:r>
+              <a:rPr lang="en-US" dirty="0" smtClean="0"/>
+              <a:t>classes.</a:t>
+            </a:r>
+          </a:p>
+          <a:p>
+            <a:r>
+              <a:rPr lang="en-US" dirty="0" smtClean="0"/>
+              <a:t>Work in progress to get higher classes covered well)</a:t>
+            </a:r>
             <a:endParaRPr lang="en-US" dirty="0"/>
           </a:p>
         </p:txBody>
@@ -6013,6 +7406,194 @@
                             </p:childTnLst>
                           </p:cTn>
                         </p:par>
+                        <p:par>
+                          <p:cTn id="15" fill="hold">
+                            <p:stCondLst>
+                              <p:cond delay="1000"/>
+                            </p:stCondLst>
+                            <p:childTnLst>
+                              <p:par>
+                                <p:cTn id="16" presetID="2" presetClass="entr" presetSubtype="8" fill="hold" grpId="0" nodeType="afterEffect">
+                                  <p:stCondLst>
+                                    <p:cond delay="0"/>
+                                  </p:stCondLst>
+                                  <p:childTnLst>
+                                    <p:set>
+                                      <p:cBhvr>
+                                        <p:cTn id="17" dur="1" fill="hold">
+                                          <p:stCondLst>
+                                            <p:cond delay="0"/>
+                                          </p:stCondLst>
+                                        </p:cTn>
+                                        <p:tgtEl>
+                                          <p:spTgt spid="3">
+                                            <p:txEl>
+                                              <p:pRg st="0" end="0"/>
+                                            </p:txEl>
+                                          </p:spTgt>
+                                        </p:tgtEl>
+                                        <p:attrNameLst>
+                                          <p:attrName>style.visibility</p:attrName>
+                                        </p:attrNameLst>
+                                      </p:cBhvr>
+                                      <p:to>
+                                        <p:strVal val="visible"/>
+                                      </p:to>
+                                    </p:set>
+                                    <p:anim calcmode="lin" valueType="num">
+                                      <p:cBhvr additive="base">
+                                        <p:cTn id="18" dur="500" fill="hold"/>
+                                        <p:tgtEl>
+                                          <p:spTgt spid="3">
+                                            <p:txEl>
+                                              <p:pRg st="0" end="0"/>
+                                            </p:txEl>
+                                          </p:spTgt>
+                                        </p:tgtEl>
+                                        <p:attrNameLst>
+                                          <p:attrName>ppt_x</p:attrName>
+                                        </p:attrNameLst>
+                                      </p:cBhvr>
+                                      <p:tavLst>
+                                        <p:tav tm="0">
+                                          <p:val>
+                                            <p:strVal val="0-#ppt_w/2"/>
+                                          </p:val>
+                                        </p:tav>
+                                        <p:tav tm="100000">
+                                          <p:val>
+                                            <p:strVal val="#ppt_x"/>
+                                          </p:val>
+                                        </p:tav>
+                                      </p:tavLst>
+                                    </p:anim>
+                                    <p:anim calcmode="lin" valueType="num">
+                                      <p:cBhvr additive="base">
+                                        <p:cTn id="19" dur="500" fill="hold"/>
+                                        <p:tgtEl>
+                                          <p:spTgt spid="3">
+                                            <p:txEl>
+                                              <p:pRg st="0" end="0"/>
+                                            </p:txEl>
+                                          </p:spTgt>
+                                        </p:tgtEl>
+                                        <p:attrNameLst>
+                                          <p:attrName>ppt_y</p:attrName>
+                                        </p:attrNameLst>
+                                      </p:cBhvr>
+                                      <p:tavLst>
+                                        <p:tav tm="0">
+                                          <p:val>
+                                            <p:strVal val="#ppt_y"/>
+                                          </p:val>
+                                        </p:tav>
+                                        <p:tav tm="100000">
+                                          <p:val>
+                                            <p:strVal val="#ppt_y"/>
+                                          </p:val>
+                                        </p:tav>
+                                      </p:tavLst>
+                                    </p:anim>
+                                  </p:childTnLst>
+                                </p:cTn>
+                              </p:par>
+                            </p:childTnLst>
+                          </p:cTn>
+                        </p:par>
+                        <p:par>
+                          <p:cTn id="20" fill="hold">
+                            <p:stCondLst>
+                              <p:cond delay="1500"/>
+                            </p:stCondLst>
+                            <p:childTnLst>
+                              <p:par>
+                                <p:cTn id="21" presetID="2" presetClass="entr" presetSubtype="8" fill="hold" grpId="0" nodeType="afterEffect">
+                                  <p:stCondLst>
+                                    <p:cond delay="0"/>
+                                  </p:stCondLst>
+                                  <p:childTnLst>
+                                    <p:set>
+                                      <p:cBhvr>
+                                        <p:cTn id="22" dur="1" fill="hold">
+                                          <p:stCondLst>
+                                            <p:cond delay="0"/>
+                                          </p:stCondLst>
+                                        </p:cTn>
+                                        <p:tgtEl>
+                                          <p:spTgt spid="3">
+                                            <p:txEl>
+                                              <p:pRg st="1" end="1"/>
+                                            </p:txEl>
+                                          </p:spTgt>
+                                        </p:tgtEl>
+                                        <p:attrNameLst>
+                                          <p:attrName>style.visibility</p:attrName>
+                                        </p:attrNameLst>
+                                      </p:cBhvr>
+                                      <p:to>
+                                        <p:strVal val="visible"/>
+                                      </p:to>
+                                    </p:set>
+                                    <p:anim calcmode="lin" valueType="num">
+                                      <p:cBhvr additive="base">
+                                        <p:cTn id="23" dur="500" fill="hold"/>
+                                        <p:tgtEl>
+                                          <p:spTgt spid="3">
+                                            <p:txEl>
+                                              <p:pRg st="1" end="1"/>
+                                            </p:txEl>
+                                          </p:spTgt>
+                                        </p:tgtEl>
+                                        <p:attrNameLst>
+                                          <p:attrName>ppt_x</p:attrName>
+                                        </p:attrNameLst>
+                                      </p:cBhvr>
+                                      <p:tavLst>
+                                        <p:tav tm="0">
+                                          <p:val>
+                                            <p:strVal val="0-#ppt_w/2"/>
+                                          </p:val>
+                                        </p:tav>
+                                        <p:tav tm="100000">
+                                          <p:val>
+                                            <p:strVal val="#ppt_x"/>
+                                          </p:val>
+                                        </p:tav>
+                                      </p:tavLst>
+                                    </p:anim>
+                                    <p:anim calcmode="lin" valueType="num">
+                                      <p:cBhvr additive="base">
+                                        <p:cTn id="24" dur="500" fill="hold"/>
+                                        <p:tgtEl>
+                                          <p:spTgt spid="3">
+                                            <p:txEl>
+                                              <p:pRg st="1" end="1"/>
+                                            </p:txEl>
+                                          </p:spTgt>
+                                        </p:tgtEl>
+                                        <p:attrNameLst>
+                                          <p:attrName>ppt_y</p:attrName>
+                                        </p:attrNameLst>
+                                      </p:cBhvr>
+                                      <p:tavLst>
+                                        <p:tav tm="0">
+                                          <p:val>
+                                            <p:strVal val="#ppt_y"/>
+                                          </p:val>
+                                        </p:tav>
+                                        <p:tav tm="100000">
+                                          <p:val>
+                                            <p:strVal val="#ppt_y"/>
+                                          </p:val>
+                                        </p:tav>
+                                      </p:tavLst>
+                                    </p:anim>
+                                  </p:childTnLst>
+                                </p:cTn>
+                              </p:par>
+                            </p:childTnLst>
+                          </p:cTn>
+                        </p:par>
                       </p:childTnLst>
                     </p:cTn>
                   </p:par>
@@ -6039,12 +7620,13 @@
     </p:tnLst>
     <p:bldLst>
       <p:bldP spid="2" grpId="0"/>
+      <p:bldP spid="3" grpId="0" uiExpand="1" build="p"/>
     </p:bldLst>
   </p:timing>
 </p:sld>
 </file>
 
-<file path=ppt/slides/slide6.xml><?xml version="1.0" encoding="utf-8"?>
+<file path=ppt/slides/slide8.xml><?xml version="1.0" encoding="utf-8"?>
 <p:sld xmlns:a="http://schemas.openxmlformats.org/drawingml/2006/main" xmlns:r="http://schemas.openxmlformats.org/officeDocument/2006/relationships" xmlns:p="http://schemas.openxmlformats.org/presentationml/2006/main">
   <p:cSld>
     <p:spTree>
@@ -6078,7 +7660,7 @@
           <a:p>
             <a:r>
               <a:rPr lang="en-US" dirty="0" smtClean="0"/>
-              <a:t>DEMO</a:t>
+              <a:t>MVP - MET</a:t>
             </a:r>
             <a:endParaRPr lang="en-US" dirty="0"/>
           </a:p>
@@ -6728,7 +8310,7 @@
 </p:sld>
 </file>
 
-<file path=ppt/slides/slide7.xml><?xml version="1.0" encoding="utf-8"?>
+<file path=ppt/slides/slide9.xml><?xml version="1.0" encoding="utf-8"?>
 <p:sld xmlns:a="http://schemas.openxmlformats.org/drawingml/2006/main" xmlns:r="http://schemas.openxmlformats.org/officeDocument/2006/relationships" xmlns:p="http://schemas.openxmlformats.org/presentationml/2006/main">
   <p:cSld>
     <p:spTree>
@@ -6757,20 +8339,26 @@
         </p:nvSpPr>
         <p:spPr>
           <a:xfrm>
-            <a:off x="272143" y="1432223"/>
-            <a:ext cx="11680371" cy="3035808"/>
+            <a:off x="1214847" y="1432223"/>
+            <a:ext cx="10884626" cy="3035808"/>
           </a:xfrm>
         </p:spPr>
         <p:txBody>
           <a:bodyPr/>
           <a:lstStyle/>
           <a:p>
-            <a:pPr algn="ctr"/>
-            <a:r>
-              <a:rPr lang="en-US" sz="10400" dirty="0" smtClean="0"/>
-              <a:t>THANK YOU VERY MUCH!</a:t>
-            </a:r>
-            <a:endParaRPr lang="en-US" sz="10400" dirty="0"/>
+            <a:r>
+              <a:rPr lang="en-US" dirty="0" smtClean="0"/>
+              <a:t>Lets look at some</a:t>
+            </a:r>
+            <a:br>
+              <a:rPr lang="en-US" dirty="0" smtClean="0"/>
+            </a:br>
+            <a:r>
+              <a:rPr lang="en-US" dirty="0" smtClean="0"/>
+              <a:t>DEMOS, CODE AND TESTS</a:t>
+            </a:r>
+            <a:endParaRPr lang="en-US" dirty="0"/>
           </a:p>
         </p:txBody>
       </p:sp>
@@ -6784,36 +8372,19 @@
             <p:ph type="subTitle" idx="1"/>
           </p:nvPr>
         </p:nvSpPr>
-        <p:spPr>
-          <a:xfrm>
-            <a:off x="1069848" y="4468030"/>
-            <a:ext cx="7891272" cy="990937"/>
-          </a:xfrm>
-        </p:spPr>
+        <p:spPr/>
         <p:txBody>
           <a:bodyPr/>
           <a:lstStyle/>
           <a:p>
-            <a:r>
-              <a:rPr lang="en-US" dirty="0" smtClean="0">
-                <a:solidFill>
-                  <a:srgbClr val="00B050"/>
-                </a:solidFill>
-              </a:rPr>
-              <a:t>puts “Any questions?”</a:t>
-            </a:r>
-            <a:endParaRPr lang="en-US" dirty="0">
-              <a:solidFill>
-                <a:srgbClr val="00B050"/>
-              </a:solidFill>
-            </a:endParaRPr>
+            <a:endParaRPr lang="en-US" dirty="0"/>
           </a:p>
         </p:txBody>
       </p:sp>
     </p:spTree>
     <p:extLst>
       <p:ext uri="{BB962C8B-B14F-4D97-AF65-F5344CB8AC3E}">
-        <p14:creationId xmlns:p14="http://schemas.microsoft.com/office/powerpoint/2010/main" val="1279007067"/>
+        <p14:creationId xmlns:p14="http://schemas.microsoft.com/office/powerpoint/2010/main" val="854413152"/>
       </p:ext>
     </p:extLst>
   </p:cSld>
@@ -6844,7 +8415,7 @@
                             </p:stCondLst>
                             <p:childTnLst>
                               <p:par>
-                                <p:cTn id="5" presetID="5" presetClass="entr" presetSubtype="10" fill="hold" grpId="0" nodeType="withEffect">
+                                <p:cTn id="5" presetID="26" presetClass="entr" presetSubtype="0" fill="hold" grpId="0" nodeType="afterEffect">
                                   <p:stCondLst>
                                     <p:cond delay="0"/>
                                   </p:stCondLst>
@@ -6867,75 +8438,27 @@
                                         <p:strVal val="visible"/>
                                       </p:to>
                                     </p:set>
-                                    <p:animEffect transition="in" filter="checkerboard(across)">
+                                    <p:animEffect transition="in" filter="wipe(down)">
                                       <p:cBhvr>
-                                        <p:cTn id="7" dur="500"/>
-                                        <p:tgtEl>
-                                          <p:spTgt spid="2"/>
-                                        </p:tgtEl>
-                                      </p:cBhvr>
-                                    </p:animEffect>
-                                  </p:childTnLst>
-                                </p:cTn>
-                              </p:par>
-                            </p:childTnLst>
-                          </p:cTn>
-                        </p:par>
-                        <p:par>
-                          <p:cTn id="8" fill="hold">
-                            <p:stCondLst>
-                              <p:cond delay="500"/>
-                            </p:stCondLst>
-                            <p:childTnLst>
-                              <p:par>
-                                <p:cTn id="9" presetID="37" presetClass="entr" presetSubtype="0" fill="hold" grpId="0" nodeType="afterEffect">
-                                  <p:stCondLst>
-                                    <p:cond delay="0"/>
-                                  </p:stCondLst>
-                                  <p:childTnLst>
-                                    <p:set>
-                                      <p:cBhvr>
-                                        <p:cTn id="10" dur="1" fill="hold">
+                                        <p:cTn id="7" dur="580">
                                           <p:stCondLst>
                                             <p:cond delay="0"/>
                                           </p:stCondLst>
                                         </p:cTn>
                                         <p:tgtEl>
-                                          <p:spTgt spid="3">
-                                            <p:txEl>
-                                              <p:pRg st="0" end="0"/>
-                                            </p:txEl>
-                                          </p:spTgt>
-                                        </p:tgtEl>
-                                        <p:attrNameLst>
-                                          <p:attrName>style.visibility</p:attrName>
-                                        </p:attrNameLst>
-                                      </p:cBhvr>
-                                      <p:to>
-                                        <p:strVal val="visible"/>
-                                      </p:to>
-                                    </p:set>
-                                    <p:animEffect transition="in" filter="fade">
-                                      <p:cBhvr>
-                                        <p:cTn id="11" dur="1000"/>
-                                        <p:tgtEl>
-                                          <p:spTgt spid="3">
-                                            <p:txEl>
-                                              <p:pRg st="0" end="0"/>
-                                            </p:txEl>
-                                          </p:spTgt>
+                                          <p:spTgt spid="2"/>
                                         </p:tgtEl>
                                       </p:cBhvr>
                                     </p:animEffect>
                                     <p:anim calcmode="lin" valueType="num">
                                       <p:cBhvr>
-                                        <p:cTn id="12" dur="1000" fill="hold"/>
-                                        <p:tgtEl>
-                                          <p:spTgt spid="3">
-                                            <p:txEl>
-                                              <p:pRg st="0" end="0"/>
-                                            </p:txEl>
-                                          </p:spTgt>
+                                        <p:cTn id="8" dur="1822" tmFilter="0,0; 0.14,0.36; 0.43,0.73; 0.71,0.91; 1.0,1.0">
+                                          <p:stCondLst>
+                                            <p:cond delay="0"/>
+                                          </p:stCondLst>
+                                        </p:cTn>
+                                        <p:tgtEl>
+                                          <p:spTgt spid="2"/>
                                         </p:tgtEl>
                                         <p:attrNameLst>
                                           <p:attrName>ppt_x</p:attrName>
@@ -6944,7 +8467,7 @@
                                       <p:tavLst>
                                         <p:tav tm="0">
                                           <p:val>
-                                            <p:strVal val="#ppt_x"/>
+                                            <p:strVal val="#ppt_x-0.25"/>
                                           </p:val>
                                         </p:tav>
                                         <p:tav tm="100000">
@@ -6956,62 +8479,216 @@
                                     </p:anim>
                                     <p:anim calcmode="lin" valueType="num">
                                       <p:cBhvr>
-                                        <p:cTn id="13" dur="900" decel="100000" fill="hold"/>
-                                        <p:tgtEl>
-                                          <p:spTgt spid="3">
-                                            <p:txEl>
-                                              <p:pRg st="0" end="0"/>
-                                            </p:txEl>
-                                          </p:spTgt>
+                                        <p:cTn id="9" dur="664" tmFilter="0.0,0.0; 0.25,0.07; 0.50,0.2; 0.75,0.467; 1.0,1.0">
+                                          <p:stCondLst>
+                                            <p:cond delay="0"/>
+                                          </p:stCondLst>
+                                        </p:cTn>
+                                        <p:tgtEl>
+                                          <p:spTgt spid="2"/>
                                         </p:tgtEl>
                                         <p:attrNameLst>
                                           <p:attrName>ppt_y</p:attrName>
                                         </p:attrNameLst>
                                       </p:cBhvr>
                                       <p:tavLst>
-                                        <p:tav tm="0">
-                                          <p:val>
-                                            <p:strVal val="#ppt_y+1"/>
+                                        <p:tav tm="0" fmla="#ppt_y-sin(pi*$)/3">
+                                          <p:val>
+                                            <p:fltVal val="0.5"/>
                                           </p:val>
                                         </p:tav>
                                         <p:tav tm="100000">
                                           <p:val>
-                                            <p:strVal val="#ppt_y-.03"/>
+                                            <p:fltVal val="1"/>
                                           </p:val>
                                         </p:tav>
                                       </p:tavLst>
                                     </p:anim>
                                     <p:anim calcmode="lin" valueType="num">
                                       <p:cBhvr>
-                                        <p:cTn id="14" dur="100" accel="100000" fill="hold">
+                                        <p:cTn id="10" dur="664" tmFilter="0, 0; 0.125,0.2665; 0.25,0.4; 0.375,0.465; 0.5,0.5;  0.625,0.535; 0.75,0.6; 0.875,0.7335; 1,1">
                                           <p:stCondLst>
-                                            <p:cond delay="900"/>
+                                            <p:cond delay="664"/>
                                           </p:stCondLst>
                                         </p:cTn>
                                         <p:tgtEl>
-                                          <p:spTgt spid="3">
-                                            <p:txEl>
-                                              <p:pRg st="0" end="0"/>
-                                            </p:txEl>
-                                          </p:spTgt>
+                                          <p:spTgt spid="2"/>
                                         </p:tgtEl>
                                         <p:attrNameLst>
                                           <p:attrName>ppt_y</p:attrName>
                                         </p:attrNameLst>
                                       </p:cBhvr>
                                       <p:tavLst>
-                                        <p:tav tm="0">
-                                          <p:val>
-                                            <p:strVal val="#ppt_y-.03"/>
+                                        <p:tav tm="0" fmla="#ppt_y-sin(pi*$)/9">
+                                          <p:val>
+                                            <p:fltVal val="0"/>
                                           </p:val>
                                         </p:tav>
                                         <p:tav tm="100000">
                                           <p:val>
-                                            <p:strVal val="#ppt_y"/>
+                                            <p:fltVal val="1"/>
                                           </p:val>
                                         </p:tav>
                                       </p:tavLst>
                                     </p:anim>
+                                    <p:anim calcmode="lin" valueType="num">
+                                      <p:cBhvr>
+                                        <p:cTn id="11" dur="332" tmFilter="0, 0; 0.125,0.2665; 0.25,0.4; 0.375,0.465; 0.5,0.5;  0.625,0.535; 0.75,0.6; 0.875,0.7335; 1,1">
+                                          <p:stCondLst>
+                                            <p:cond delay="1324"/>
+                                          </p:stCondLst>
+                                        </p:cTn>
+                                        <p:tgtEl>
+                                          <p:spTgt spid="2"/>
+                                        </p:tgtEl>
+                                        <p:attrNameLst>
+                                          <p:attrName>ppt_y</p:attrName>
+                                        </p:attrNameLst>
+                                      </p:cBhvr>
+                                      <p:tavLst>
+                                        <p:tav tm="0" fmla="#ppt_y-sin(pi*$)/27">
+                                          <p:val>
+                                            <p:fltVal val="0"/>
+                                          </p:val>
+                                        </p:tav>
+                                        <p:tav tm="100000">
+                                          <p:val>
+                                            <p:fltVal val="1"/>
+                                          </p:val>
+                                        </p:tav>
+                                      </p:tavLst>
+                                    </p:anim>
+                                    <p:anim calcmode="lin" valueType="num">
+                                      <p:cBhvr>
+                                        <p:cTn id="12" dur="164" tmFilter="0, 0; 0.125,0.2665; 0.25,0.4; 0.375,0.465; 0.5,0.5;  0.625,0.535; 0.75,0.6; 0.875,0.7335; 1,1">
+                                          <p:stCondLst>
+                                            <p:cond delay="1656"/>
+                                          </p:stCondLst>
+                                        </p:cTn>
+                                        <p:tgtEl>
+                                          <p:spTgt spid="2"/>
+                                        </p:tgtEl>
+                                        <p:attrNameLst>
+                                          <p:attrName>ppt_y</p:attrName>
+                                        </p:attrNameLst>
+                                      </p:cBhvr>
+                                      <p:tavLst>
+                                        <p:tav tm="0" fmla="#ppt_y-sin(pi*$)/81">
+                                          <p:val>
+                                            <p:fltVal val="0"/>
+                                          </p:val>
+                                        </p:tav>
+                                        <p:tav tm="100000">
+                                          <p:val>
+                                            <p:fltVal val="1"/>
+                                          </p:val>
+                                        </p:tav>
+                                      </p:tavLst>
+                                    </p:anim>
+                                    <p:animScale>
+                                      <p:cBhvr>
+                                        <p:cTn id="13" dur="26">
+                                          <p:stCondLst>
+                                            <p:cond delay="650"/>
+                                          </p:stCondLst>
+                                        </p:cTn>
+                                        <p:tgtEl>
+                                          <p:spTgt spid="2"/>
+                                        </p:tgtEl>
+                                      </p:cBhvr>
+                                      <p:to x="100000" y="60000"/>
+                                    </p:animScale>
+                                    <p:animScale>
+                                      <p:cBhvr>
+                                        <p:cTn id="14" dur="166" decel="50000">
+                                          <p:stCondLst>
+                                            <p:cond delay="676"/>
+                                          </p:stCondLst>
+                                        </p:cTn>
+                                        <p:tgtEl>
+                                          <p:spTgt spid="2"/>
+                                        </p:tgtEl>
+                                      </p:cBhvr>
+                                      <p:to x="100000" y="100000"/>
+                                    </p:animScale>
+                                    <p:animScale>
+                                      <p:cBhvr>
+                                        <p:cTn id="15" dur="26">
+                                          <p:stCondLst>
+                                            <p:cond delay="1312"/>
+                                          </p:stCondLst>
+                                        </p:cTn>
+                                        <p:tgtEl>
+                                          <p:spTgt spid="2"/>
+                                        </p:tgtEl>
+                                      </p:cBhvr>
+                                      <p:to x="100000" y="80000"/>
+                                    </p:animScale>
+                                    <p:animScale>
+                                      <p:cBhvr>
+                                        <p:cTn id="16" dur="166" decel="50000">
+                                          <p:stCondLst>
+                                            <p:cond delay="1338"/>
+                                          </p:stCondLst>
+                                        </p:cTn>
+                                        <p:tgtEl>
+                                          <p:spTgt spid="2"/>
+                                        </p:tgtEl>
+                                      </p:cBhvr>
+                                      <p:to x="100000" y="100000"/>
+                                    </p:animScale>
+                                    <p:animScale>
+                                      <p:cBhvr>
+                                        <p:cTn id="17" dur="26">
+                                          <p:stCondLst>
+                                            <p:cond delay="1642"/>
+                                          </p:stCondLst>
+                                        </p:cTn>
+                                        <p:tgtEl>
+                                          <p:spTgt spid="2"/>
+                                        </p:tgtEl>
+                                      </p:cBhvr>
+                                      <p:to x="100000" y="90000"/>
+                                    </p:animScale>
+                                    <p:animScale>
+                                      <p:cBhvr>
+                                        <p:cTn id="18" dur="166" decel="50000">
+                                          <p:stCondLst>
+                                            <p:cond delay="1668"/>
+                                          </p:stCondLst>
+                                        </p:cTn>
+                                        <p:tgtEl>
+                                          <p:spTgt spid="2"/>
+                                        </p:tgtEl>
+                                      </p:cBhvr>
+                                      <p:to x="100000" y="100000"/>
+                                    </p:animScale>
+                                    <p:animScale>
+                                      <p:cBhvr>
+                                        <p:cTn id="19" dur="26">
+                                          <p:stCondLst>
+                                            <p:cond delay="1808"/>
+                                          </p:stCondLst>
+                                        </p:cTn>
+                                        <p:tgtEl>
+                                          <p:spTgt spid="2"/>
+                                        </p:tgtEl>
+                                      </p:cBhvr>
+                                      <p:to x="100000" y="95000"/>
+                                    </p:animScale>
+                                    <p:animScale>
+                                      <p:cBhvr>
+                                        <p:cTn id="20" dur="166" decel="50000">
+                                          <p:stCondLst>
+                                            <p:cond delay="1834"/>
+                                          </p:stCondLst>
+                                        </p:cTn>
+                                        <p:tgtEl>
+                                          <p:spTgt spid="2"/>
+                                        </p:tgtEl>
+                                      </p:cBhvr>
+                                      <p:to x="100000" y="100000"/>
+                                    </p:animScale>
                                   </p:childTnLst>
                                 </p:cTn>
                               </p:par>
@@ -7044,7 +8721,6 @@
     </p:tnLst>
     <p:bldLst>
       <p:bldP spid="2" grpId="0"/>
-      <p:bldP spid="3" grpId="0" build="p"/>
     </p:bldLst>
   </p:timing>
 </p:sld>

</xml_diff>